<commit_message>
Added last slide for closure
</commit_message>
<xml_diff>
--- a/Kafka.pptx
+++ b/Kafka.pptx
@@ -5,7 +5,7 @@
     <p:sldMasterId id="2147483858" r:id="rId1"/>
   </p:sldMasterIdLst>
   <p:notesMasterIdLst>
-    <p:notesMasterId r:id="rId20"/>
+    <p:notesMasterId r:id="rId21"/>
   </p:notesMasterIdLst>
   <p:sldIdLst>
     <p:sldId id="256" r:id="rId2"/>
@@ -26,6 +26,7 @@
     <p:sldId id="272" r:id="rId17"/>
     <p:sldId id="274" r:id="rId18"/>
     <p:sldId id="275" r:id="rId19"/>
+    <p:sldId id="276" r:id="rId20"/>
   </p:sldIdLst>
   <p:sldSz cx="12192000" cy="6858000"/>
   <p:notesSz cx="6858000" cy="9144000"/>
@@ -130,6 +131,10 @@
     </p:ext>
   </p:extLst>
 </p:presentation>
+</file>
+
+<file path=ppt/activeX/activeX1.xml><?xml version="1.0" encoding="utf-8"?>
+<ax:ocx xmlns:ax="http://schemas.microsoft.com/office/2006/activeX" xmlns:r="http://schemas.openxmlformats.org/officeDocument/2006/relationships" ax:classid="{D27CDB6E-AE6D-11CF-96B8-444553540000}" ax:persistence="persistStorage" r:id="rId1"/>
 </file>
 
 <file path=ppt/notesMasters/notesMaster1.xml><?xml version="1.0" encoding="utf-8"?>
@@ -853,7 +858,7 @@
           <a:noFill/>
           <a:extLst>
             <a:ext uri="{909E8E84-426E-40dd-AFC4-6F175D3DCCD1}">
-              <a14:hiddenFill xmlns="" xmlns:a14="http://schemas.microsoft.com/office/drawing/2010/main">
+              <a14:hiddenFill xmlns:a14="http://schemas.microsoft.com/office/drawing/2010/main" xmlns="">
                 <a:solidFill>
                   <a:srgbClr val="FFFFFF"/>
                 </a:solidFill>
@@ -912,7 +917,7 @@
             </a:ln>
             <a:extLst>
               <a:ext uri="{91240B29-F687-4f45-9708-019B960494DF}">
-                <a14:hiddenLine xmlns="" xmlns:a14="http://schemas.microsoft.com/office/drawing/2010/main" w="9525">
+                <a14:hiddenLine xmlns:a14="http://schemas.microsoft.com/office/drawing/2010/main" xmlns="" w="9525">
                   <a:solidFill>
                     <a:srgbClr val="000000"/>
                   </a:solidFill>
@@ -1002,7 +1007,7 @@
             </a:ln>
             <a:extLst>
               <a:ext uri="{91240B29-F687-4f45-9708-019B960494DF}">
-                <a14:hiddenLine xmlns="" xmlns:a14="http://schemas.microsoft.com/office/drawing/2010/main" w="9525">
+                <a14:hiddenLine xmlns:a14="http://schemas.microsoft.com/office/drawing/2010/main" xmlns="" w="9525">
                   <a:solidFill>
                     <a:srgbClr val="000000"/>
                   </a:solidFill>
@@ -1092,7 +1097,7 @@
             </a:ln>
             <a:extLst>
               <a:ext uri="{91240B29-F687-4f45-9708-019B960494DF}">
-                <a14:hiddenLine xmlns="" xmlns:a14="http://schemas.microsoft.com/office/drawing/2010/main" w="9525">
+                <a14:hiddenLine xmlns:a14="http://schemas.microsoft.com/office/drawing/2010/main" xmlns="" w="9525">
                   <a:solidFill>
                     <a:srgbClr val="000000"/>
                   </a:solidFill>
@@ -1126,7 +1131,7 @@
             </a:ln>
             <a:extLst>
               <a:ext uri="{91240B29-F687-4f45-9708-019B960494DF}">
-                <a14:hiddenLine xmlns="" xmlns:a14="http://schemas.microsoft.com/office/drawing/2010/main" w="9525">
+                <a14:hiddenLine xmlns:a14="http://schemas.microsoft.com/office/drawing/2010/main" xmlns="" w="9525">
                   <a:solidFill>
                     <a:srgbClr val="000000"/>
                   </a:solidFill>
@@ -1216,7 +1221,7 @@
             </a:ln>
             <a:extLst>
               <a:ext uri="{91240B29-F687-4f45-9708-019B960494DF}">
-                <a14:hiddenLine xmlns="" xmlns:a14="http://schemas.microsoft.com/office/drawing/2010/main" w="9525">
+                <a14:hiddenLine xmlns:a14="http://schemas.microsoft.com/office/drawing/2010/main" xmlns="" w="9525">
                   <a:solidFill>
                     <a:srgbClr val="000000"/>
                   </a:solidFill>
@@ -1278,7 +1283,7 @@
             </a:ln>
             <a:extLst>
               <a:ext uri="{91240B29-F687-4f45-9708-019B960494DF}">
-                <a14:hiddenLine xmlns="" xmlns:a14="http://schemas.microsoft.com/office/drawing/2010/main" w="9525">
+                <a14:hiddenLine xmlns:a14="http://schemas.microsoft.com/office/drawing/2010/main" xmlns="" w="9525">
                   <a:solidFill>
                     <a:srgbClr val="000000"/>
                   </a:solidFill>
@@ -1340,7 +1345,7 @@
             </a:ln>
             <a:extLst>
               <a:ext uri="{91240B29-F687-4f45-9708-019B960494DF}">
-                <a14:hiddenLine xmlns="" xmlns:a14="http://schemas.microsoft.com/office/drawing/2010/main" w="9525">
+                <a14:hiddenLine xmlns:a14="http://schemas.microsoft.com/office/drawing/2010/main" xmlns="" w="9525">
                   <a:solidFill>
                     <a:srgbClr val="000000"/>
                   </a:solidFill>
@@ -1430,7 +1435,7 @@
             </a:ln>
             <a:extLst>
               <a:ext uri="{91240B29-F687-4f45-9708-019B960494DF}">
-                <a14:hiddenLine xmlns="" xmlns:a14="http://schemas.microsoft.com/office/drawing/2010/main" w="9525">
+                <a14:hiddenLine xmlns:a14="http://schemas.microsoft.com/office/drawing/2010/main" xmlns="" w="9525">
                   <a:solidFill>
                     <a:srgbClr val="000000"/>
                   </a:solidFill>
@@ -1492,7 +1497,7 @@
             </a:ln>
             <a:extLst>
               <a:ext uri="{91240B29-F687-4f45-9708-019B960494DF}">
-                <a14:hiddenLine xmlns="" xmlns:a14="http://schemas.microsoft.com/office/drawing/2010/main" w="9525">
+                <a14:hiddenLine xmlns:a14="http://schemas.microsoft.com/office/drawing/2010/main" xmlns="" w="9525">
                   <a:solidFill>
                     <a:srgbClr val="000000"/>
                   </a:solidFill>
@@ -1554,7 +1559,7 @@
             </a:ln>
             <a:extLst>
               <a:ext uri="{91240B29-F687-4f45-9708-019B960494DF}">
-                <a14:hiddenLine xmlns="" xmlns:a14="http://schemas.microsoft.com/office/drawing/2010/main" w="9525">
+                <a14:hiddenLine xmlns:a14="http://schemas.microsoft.com/office/drawing/2010/main" xmlns="" w="9525">
                   <a:solidFill>
                     <a:srgbClr val="000000"/>
                   </a:solidFill>
@@ -1644,7 +1649,7 @@
             </a:ln>
             <a:extLst>
               <a:ext uri="{91240B29-F687-4f45-9708-019B960494DF}">
-                <a14:hiddenLine xmlns="" xmlns:a14="http://schemas.microsoft.com/office/drawing/2010/main" w="9525">
+                <a14:hiddenLine xmlns:a14="http://schemas.microsoft.com/office/drawing/2010/main" xmlns="" w="9525">
                   <a:solidFill>
                     <a:srgbClr val="000000"/>
                   </a:solidFill>
@@ -1734,7 +1739,7 @@
             </a:ln>
             <a:extLst>
               <a:ext uri="{91240B29-F687-4f45-9708-019B960494DF}">
-                <a14:hiddenLine xmlns="" xmlns:a14="http://schemas.microsoft.com/office/drawing/2010/main" w="9525">
+                <a14:hiddenLine xmlns:a14="http://schemas.microsoft.com/office/drawing/2010/main" xmlns="" w="9525">
                   <a:solidFill>
                     <a:srgbClr val="000000"/>
                   </a:solidFill>
@@ -1796,7 +1801,7 @@
             </a:ln>
             <a:extLst>
               <a:ext uri="{91240B29-F687-4f45-9708-019B960494DF}">
-                <a14:hiddenLine xmlns="" xmlns:a14="http://schemas.microsoft.com/office/drawing/2010/main" w="9525">
+                <a14:hiddenLine xmlns:a14="http://schemas.microsoft.com/office/drawing/2010/main" xmlns="" w="9525">
                   <a:solidFill>
                     <a:srgbClr val="000000"/>
                   </a:solidFill>
@@ -1906,7 +1911,7 @@
             </a:ln>
             <a:extLst>
               <a:ext uri="{91240B29-F687-4f45-9708-019B960494DF}">
-                <a14:hiddenLine xmlns="" xmlns:a14="http://schemas.microsoft.com/office/drawing/2010/main" w="9525">
+                <a14:hiddenLine xmlns:a14="http://schemas.microsoft.com/office/drawing/2010/main" xmlns="" w="9525">
                   <a:solidFill>
                     <a:srgbClr val="000000"/>
                   </a:solidFill>
@@ -1968,7 +1973,7 @@
             </a:ln>
             <a:extLst>
               <a:ext uri="{91240B29-F687-4f45-9708-019B960494DF}">
-                <a14:hiddenLine xmlns="" xmlns:a14="http://schemas.microsoft.com/office/drawing/2010/main" w="9525">
+                <a14:hiddenLine xmlns:a14="http://schemas.microsoft.com/office/drawing/2010/main" xmlns="" w="9525">
                   <a:solidFill>
                     <a:srgbClr val="000000"/>
                   </a:solidFill>
@@ -2058,7 +2063,7 @@
             </a:ln>
             <a:extLst>
               <a:ext uri="{91240B29-F687-4f45-9708-019B960494DF}">
-                <a14:hiddenLine xmlns="" xmlns:a14="http://schemas.microsoft.com/office/drawing/2010/main" w="9525">
+                <a14:hiddenLine xmlns:a14="http://schemas.microsoft.com/office/drawing/2010/main" xmlns="" w="9525">
                   <a:solidFill>
                     <a:srgbClr val="000000"/>
                   </a:solidFill>
@@ -2148,7 +2153,7 @@
             </a:ln>
             <a:extLst>
               <a:ext uri="{91240B29-F687-4f45-9708-019B960494DF}">
-                <a14:hiddenLine xmlns="" xmlns:a14="http://schemas.microsoft.com/office/drawing/2010/main" w="9525">
+                <a14:hiddenLine xmlns:a14="http://schemas.microsoft.com/office/drawing/2010/main" xmlns="" w="9525">
                   <a:solidFill>
                     <a:srgbClr val="000000"/>
                   </a:solidFill>
@@ -2210,7 +2215,7 @@
             </a:ln>
             <a:extLst>
               <a:ext uri="{91240B29-F687-4f45-9708-019B960494DF}">
-                <a14:hiddenLine xmlns="" xmlns:a14="http://schemas.microsoft.com/office/drawing/2010/main" w="9525">
+                <a14:hiddenLine xmlns:a14="http://schemas.microsoft.com/office/drawing/2010/main" xmlns="" w="9525">
                   <a:solidFill>
                     <a:srgbClr val="000000"/>
                   </a:solidFill>
@@ -2300,7 +2305,7 @@
             </a:ln>
             <a:extLst>
               <a:ext uri="{91240B29-F687-4f45-9708-019B960494DF}">
-                <a14:hiddenLine xmlns="" xmlns:a14="http://schemas.microsoft.com/office/drawing/2010/main" w="9525">
+                <a14:hiddenLine xmlns:a14="http://schemas.microsoft.com/office/drawing/2010/main" xmlns="" w="9525">
                   <a:solidFill>
                     <a:srgbClr val="000000"/>
                   </a:solidFill>
@@ -2390,7 +2395,7 @@
             </a:ln>
             <a:extLst>
               <a:ext uri="{91240B29-F687-4f45-9708-019B960494DF}">
-                <a14:hiddenLine xmlns="" xmlns:a14="http://schemas.microsoft.com/office/drawing/2010/main" w="9525">
+                <a14:hiddenLine xmlns:a14="http://schemas.microsoft.com/office/drawing/2010/main" xmlns="" w="9525">
                   <a:solidFill>
                     <a:srgbClr val="000000"/>
                   </a:solidFill>
@@ -2446,7 +2451,7 @@
             </a:ln>
             <a:extLst>
               <a:ext uri="{91240B29-F687-4f45-9708-019B960494DF}">
-                <a14:hiddenLine xmlns="" xmlns:a14="http://schemas.microsoft.com/office/drawing/2010/main" w="9525">
+                <a14:hiddenLine xmlns:a14="http://schemas.microsoft.com/office/drawing/2010/main" xmlns="" w="9525">
                   <a:solidFill>
                     <a:srgbClr val="000000"/>
                   </a:solidFill>
@@ -2536,7 +2541,7 @@
             </a:ln>
             <a:extLst>
               <a:ext uri="{91240B29-F687-4f45-9708-019B960494DF}">
-                <a14:hiddenLine xmlns="" xmlns:a14="http://schemas.microsoft.com/office/drawing/2010/main" w="9525">
+                <a14:hiddenLine xmlns:a14="http://schemas.microsoft.com/office/drawing/2010/main" xmlns="" w="9525">
                   <a:solidFill>
                     <a:srgbClr val="000000"/>
                   </a:solidFill>
@@ -2592,7 +2597,7 @@
             </a:ln>
             <a:extLst>
               <a:ext uri="{91240B29-F687-4f45-9708-019B960494DF}">
-                <a14:hiddenLine xmlns="" xmlns:a14="http://schemas.microsoft.com/office/drawing/2010/main" w="9525">
+                <a14:hiddenLine xmlns:a14="http://schemas.microsoft.com/office/drawing/2010/main" xmlns="" w="9525">
                   <a:solidFill>
                     <a:srgbClr val="000000"/>
                   </a:solidFill>
@@ -2682,7 +2687,7 @@
             </a:ln>
             <a:extLst>
               <a:ext uri="{91240B29-F687-4f45-9708-019B960494DF}">
-                <a14:hiddenLine xmlns="" xmlns:a14="http://schemas.microsoft.com/office/drawing/2010/main" w="9525">
+                <a14:hiddenLine xmlns:a14="http://schemas.microsoft.com/office/drawing/2010/main" xmlns="" w="9525">
                   <a:solidFill>
                     <a:srgbClr val="000000"/>
                   </a:solidFill>
@@ -2750,7 +2755,7 @@
             </a:ln>
             <a:extLst>
               <a:ext uri="{91240B29-F687-4f45-9708-019B960494DF}">
-                <a14:hiddenLine xmlns="" xmlns:a14="http://schemas.microsoft.com/office/drawing/2010/main" w="9525">
+                <a14:hiddenLine xmlns:a14="http://schemas.microsoft.com/office/drawing/2010/main" xmlns="" w="9525">
                   <a:solidFill>
                     <a:srgbClr val="000000"/>
                   </a:solidFill>
@@ -2840,7 +2845,7 @@
             </a:ln>
             <a:extLst>
               <a:ext uri="{91240B29-F687-4f45-9708-019B960494DF}">
-                <a14:hiddenLine xmlns="" xmlns:a14="http://schemas.microsoft.com/office/drawing/2010/main" w="9525">
+                <a14:hiddenLine xmlns:a14="http://schemas.microsoft.com/office/drawing/2010/main" xmlns="" w="9525">
                   <a:solidFill>
                     <a:srgbClr val="000000"/>
                   </a:solidFill>
@@ -2908,7 +2913,7 @@
             </a:ln>
             <a:extLst>
               <a:ext uri="{91240B29-F687-4f45-9708-019B960494DF}">
-                <a14:hiddenLine xmlns="" xmlns:a14="http://schemas.microsoft.com/office/drawing/2010/main" w="9525">
+                <a14:hiddenLine xmlns:a14="http://schemas.microsoft.com/office/drawing/2010/main" xmlns="" w="9525">
                   <a:solidFill>
                     <a:srgbClr val="000000"/>
                   </a:solidFill>
@@ -2998,7 +3003,7 @@
             </a:ln>
             <a:extLst>
               <a:ext uri="{91240B29-F687-4f45-9708-019B960494DF}">
-                <a14:hiddenLine xmlns="" xmlns:a14="http://schemas.microsoft.com/office/drawing/2010/main" w="9525">
+                <a14:hiddenLine xmlns:a14="http://schemas.microsoft.com/office/drawing/2010/main" xmlns="" w="9525">
                   <a:solidFill>
                     <a:srgbClr val="000000"/>
                   </a:solidFill>
@@ -3032,7 +3037,7 @@
             </a:ln>
             <a:extLst>
               <a:ext uri="{91240B29-F687-4f45-9708-019B960494DF}">
-                <a14:hiddenLine xmlns="" xmlns:a14="http://schemas.microsoft.com/office/drawing/2010/main" w="9525">
+                <a14:hiddenLine xmlns:a14="http://schemas.microsoft.com/office/drawing/2010/main" xmlns="" w="9525">
                   <a:solidFill>
                     <a:srgbClr val="000000"/>
                   </a:solidFill>
@@ -3122,7 +3127,7 @@
             </a:ln>
             <a:extLst>
               <a:ext uri="{91240B29-F687-4f45-9708-019B960494DF}">
-                <a14:hiddenLine xmlns="" xmlns:a14="http://schemas.microsoft.com/office/drawing/2010/main" w="9525">
+                <a14:hiddenLine xmlns:a14="http://schemas.microsoft.com/office/drawing/2010/main" xmlns="" w="9525">
                   <a:solidFill>
                     <a:srgbClr val="000000"/>
                   </a:solidFill>
@@ -3184,7 +3189,7 @@
             </a:ln>
             <a:extLst>
               <a:ext uri="{91240B29-F687-4f45-9708-019B960494DF}">
-                <a14:hiddenLine xmlns="" xmlns:a14="http://schemas.microsoft.com/office/drawing/2010/main" w="9525">
+                <a14:hiddenLine xmlns:a14="http://schemas.microsoft.com/office/drawing/2010/main" xmlns="" w="9525">
                   <a:solidFill>
                     <a:srgbClr val="000000"/>
                   </a:solidFill>
@@ -3246,7 +3251,7 @@
             </a:ln>
             <a:extLst>
               <a:ext uri="{91240B29-F687-4f45-9708-019B960494DF}">
-                <a14:hiddenLine xmlns="" xmlns:a14="http://schemas.microsoft.com/office/drawing/2010/main" w="9525">
+                <a14:hiddenLine xmlns:a14="http://schemas.microsoft.com/office/drawing/2010/main" xmlns="" w="9525">
                   <a:solidFill>
                     <a:srgbClr val="000000"/>
                   </a:solidFill>
@@ -3336,7 +3341,7 @@
             </a:ln>
             <a:extLst>
               <a:ext uri="{91240B29-F687-4f45-9708-019B960494DF}">
-                <a14:hiddenLine xmlns="" xmlns:a14="http://schemas.microsoft.com/office/drawing/2010/main" w="9525">
+                <a14:hiddenLine xmlns:a14="http://schemas.microsoft.com/office/drawing/2010/main" xmlns="" w="9525">
                   <a:solidFill>
                     <a:srgbClr val="000000"/>
                   </a:solidFill>
@@ -3404,7 +3409,7 @@
             </a:ln>
             <a:extLst>
               <a:ext uri="{91240B29-F687-4f45-9708-019B960494DF}">
-                <a14:hiddenLine xmlns="" xmlns:a14="http://schemas.microsoft.com/office/drawing/2010/main" w="9525">
+                <a14:hiddenLine xmlns:a14="http://schemas.microsoft.com/office/drawing/2010/main" xmlns="" w="9525">
                   <a:solidFill>
                     <a:srgbClr val="000000"/>
                   </a:solidFill>
@@ -3466,7 +3471,7 @@
             </a:ln>
             <a:extLst>
               <a:ext uri="{91240B29-F687-4f45-9708-019B960494DF}">
-                <a14:hiddenLine xmlns="" xmlns:a14="http://schemas.microsoft.com/office/drawing/2010/main" w="9525">
+                <a14:hiddenLine xmlns:a14="http://schemas.microsoft.com/office/drawing/2010/main" xmlns="" w="9525">
                   <a:solidFill>
                     <a:srgbClr val="000000"/>
                   </a:solidFill>
@@ -3556,7 +3561,7 @@
             </a:ln>
             <a:extLst>
               <a:ext uri="{91240B29-F687-4f45-9708-019B960494DF}">
-                <a14:hiddenLine xmlns="" xmlns:a14="http://schemas.microsoft.com/office/drawing/2010/main" w="9525">
+                <a14:hiddenLine xmlns:a14="http://schemas.microsoft.com/office/drawing/2010/main" xmlns="" w="9525">
                   <a:solidFill>
                     <a:srgbClr val="000000"/>
                   </a:solidFill>
@@ -3618,7 +3623,7 @@
             </a:ln>
             <a:extLst>
               <a:ext uri="{91240B29-F687-4f45-9708-019B960494DF}">
-                <a14:hiddenLine xmlns="" xmlns:a14="http://schemas.microsoft.com/office/drawing/2010/main" w="9525">
+                <a14:hiddenLine xmlns:a14="http://schemas.microsoft.com/office/drawing/2010/main" xmlns="" w="9525">
                   <a:solidFill>
                     <a:srgbClr val="000000"/>
                   </a:solidFill>
@@ -3708,7 +3713,7 @@
             </a:ln>
             <a:extLst>
               <a:ext uri="{91240B29-F687-4f45-9708-019B960494DF}">
-                <a14:hiddenLine xmlns="" xmlns:a14="http://schemas.microsoft.com/office/drawing/2010/main" w="9525">
+                <a14:hiddenLine xmlns:a14="http://schemas.microsoft.com/office/drawing/2010/main" xmlns="" w="9525">
                   <a:solidFill>
                     <a:srgbClr val="000000"/>
                   </a:solidFill>
@@ -3770,7 +3775,7 @@
             </a:ln>
             <a:extLst>
               <a:ext uri="{91240B29-F687-4f45-9708-019B960494DF}">
-                <a14:hiddenLine xmlns="" xmlns:a14="http://schemas.microsoft.com/office/drawing/2010/main" w="9525">
+                <a14:hiddenLine xmlns:a14="http://schemas.microsoft.com/office/drawing/2010/main" xmlns="" w="9525">
                   <a:solidFill>
                     <a:srgbClr val="000000"/>
                   </a:solidFill>
@@ -3860,7 +3865,7 @@
             </a:ln>
             <a:extLst>
               <a:ext uri="{91240B29-F687-4f45-9708-019B960494DF}">
-                <a14:hiddenLine xmlns="" xmlns:a14="http://schemas.microsoft.com/office/drawing/2010/main" w="9525">
+                <a14:hiddenLine xmlns:a14="http://schemas.microsoft.com/office/drawing/2010/main" xmlns="" w="9525">
                   <a:solidFill>
                     <a:srgbClr val="000000"/>
                   </a:solidFill>
@@ -3894,7 +3899,7 @@
             </a:ln>
             <a:extLst>
               <a:ext uri="{91240B29-F687-4f45-9708-019B960494DF}">
-                <a14:hiddenLine xmlns="" xmlns:a14="http://schemas.microsoft.com/office/drawing/2010/main" w="9525">
+                <a14:hiddenLine xmlns:a14="http://schemas.microsoft.com/office/drawing/2010/main" xmlns="" w="9525">
                   <a:solidFill>
                     <a:srgbClr val="000000"/>
                   </a:solidFill>
@@ -3959,7 +3964,7 @@
             </a:ln>
             <a:extLst>
               <a:ext uri="{91240B29-F687-4f45-9708-019B960494DF}">
-                <a14:hiddenLine xmlns="" xmlns:a14="http://schemas.microsoft.com/office/drawing/2010/main" w="9525">
+                <a14:hiddenLine xmlns:a14="http://schemas.microsoft.com/office/drawing/2010/main" xmlns="" w="9525">
                   <a:solidFill>
                     <a:srgbClr val="000000"/>
                   </a:solidFill>
@@ -4049,7 +4054,7 @@
             </a:ln>
             <a:extLst>
               <a:ext uri="{91240B29-F687-4f45-9708-019B960494DF}">
-                <a14:hiddenLine xmlns="" xmlns:a14="http://schemas.microsoft.com/office/drawing/2010/main" w="9525">
+                <a14:hiddenLine xmlns:a14="http://schemas.microsoft.com/office/drawing/2010/main" xmlns="" w="9525">
                   <a:solidFill>
                     <a:srgbClr val="000000"/>
                   </a:solidFill>
@@ -4111,7 +4116,7 @@
             </a:ln>
             <a:extLst>
               <a:ext uri="{91240B29-F687-4f45-9708-019B960494DF}">
-                <a14:hiddenLine xmlns="" xmlns:a14="http://schemas.microsoft.com/office/drawing/2010/main" w="9525">
+                <a14:hiddenLine xmlns:a14="http://schemas.microsoft.com/office/drawing/2010/main" xmlns="" w="9525">
                   <a:solidFill>
                     <a:srgbClr val="000000"/>
                   </a:solidFill>
@@ -4201,7 +4206,7 @@
             </a:ln>
             <a:extLst>
               <a:ext uri="{91240B29-F687-4f45-9708-019B960494DF}">
-                <a14:hiddenLine xmlns="" xmlns:a14="http://schemas.microsoft.com/office/drawing/2010/main" w="9525">
+                <a14:hiddenLine xmlns:a14="http://schemas.microsoft.com/office/drawing/2010/main" xmlns="" w="9525">
                   <a:solidFill>
                     <a:srgbClr val="000000"/>
                   </a:solidFill>
@@ -4291,7 +4296,7 @@
             </a:ln>
             <a:extLst>
               <a:ext uri="{91240B29-F687-4f45-9708-019B960494DF}">
-                <a14:hiddenLine xmlns="" xmlns:a14="http://schemas.microsoft.com/office/drawing/2010/main" w="9525">
+                <a14:hiddenLine xmlns:a14="http://schemas.microsoft.com/office/drawing/2010/main" xmlns="" w="9525">
                   <a:solidFill>
                     <a:srgbClr val="000000"/>
                   </a:solidFill>
@@ -4356,7 +4361,7 @@
             </a:ln>
             <a:extLst>
               <a:ext uri="{91240B29-F687-4f45-9708-019B960494DF}">
-                <a14:hiddenLine xmlns="" xmlns:a14="http://schemas.microsoft.com/office/drawing/2010/main" w="9525">
+                <a14:hiddenLine xmlns:a14="http://schemas.microsoft.com/office/drawing/2010/main" xmlns="" w="9525">
                   <a:solidFill>
                     <a:srgbClr val="000000"/>
                   </a:solidFill>
@@ -4418,7 +4423,7 @@
             </a:ln>
             <a:extLst>
               <a:ext uri="{91240B29-F687-4f45-9708-019B960494DF}">
-                <a14:hiddenLine xmlns="" xmlns:a14="http://schemas.microsoft.com/office/drawing/2010/main" w="9525">
+                <a14:hiddenLine xmlns:a14="http://schemas.microsoft.com/office/drawing/2010/main" xmlns="" w="9525">
                   <a:solidFill>
                     <a:srgbClr val="000000"/>
                   </a:solidFill>
@@ -4508,7 +4513,7 @@
             </a:ln>
             <a:extLst>
               <a:ext uri="{91240B29-F687-4f45-9708-019B960494DF}">
-                <a14:hiddenLine xmlns="" xmlns:a14="http://schemas.microsoft.com/office/drawing/2010/main" w="9525">
+                <a14:hiddenLine xmlns:a14="http://schemas.microsoft.com/office/drawing/2010/main" xmlns="" w="9525">
                   <a:solidFill>
                     <a:srgbClr val="000000"/>
                   </a:solidFill>
@@ -4598,7 +4603,7 @@
             </a:ln>
             <a:extLst>
               <a:ext uri="{91240B29-F687-4f45-9708-019B960494DF}">
-                <a14:hiddenLine xmlns="" xmlns:a14="http://schemas.microsoft.com/office/drawing/2010/main" w="9525">
+                <a14:hiddenLine xmlns:a14="http://schemas.microsoft.com/office/drawing/2010/main" xmlns="" w="9525">
                   <a:solidFill>
                     <a:srgbClr val="000000"/>
                   </a:solidFill>
@@ -4660,7 +4665,7 @@
             </a:ln>
             <a:extLst>
               <a:ext uri="{91240B29-F687-4f45-9708-019B960494DF}">
-                <a14:hiddenLine xmlns="" xmlns:a14="http://schemas.microsoft.com/office/drawing/2010/main" w="9525">
+                <a14:hiddenLine xmlns:a14="http://schemas.microsoft.com/office/drawing/2010/main" xmlns="" w="9525">
                   <a:solidFill>
                     <a:srgbClr val="000000"/>
                   </a:solidFill>
@@ -4780,7 +4785,7 @@
             </a:ln>
             <a:extLst>
               <a:ext uri="{91240B29-F687-4f45-9708-019B960494DF}">
-                <a14:hiddenLine xmlns="" xmlns:a14="http://schemas.microsoft.com/office/drawing/2010/main" w="9525">
+                <a14:hiddenLine xmlns:a14="http://schemas.microsoft.com/office/drawing/2010/main" xmlns="" w="9525">
                   <a:solidFill>
                     <a:srgbClr val="000000"/>
                   </a:solidFill>
@@ -4848,7 +4853,7 @@
             </a:ln>
             <a:extLst>
               <a:ext uri="{91240B29-F687-4f45-9708-019B960494DF}">
-                <a14:hiddenLine xmlns="" xmlns:a14="http://schemas.microsoft.com/office/drawing/2010/main" w="9525">
+                <a14:hiddenLine xmlns:a14="http://schemas.microsoft.com/office/drawing/2010/main" xmlns="" w="9525">
                   <a:solidFill>
                     <a:srgbClr val="000000"/>
                   </a:solidFill>
@@ -4938,7 +4943,7 @@
             </a:ln>
             <a:extLst>
               <a:ext uri="{91240B29-F687-4f45-9708-019B960494DF}">
-                <a14:hiddenLine xmlns="" xmlns:a14="http://schemas.microsoft.com/office/drawing/2010/main" w="9525">
+                <a14:hiddenLine xmlns:a14="http://schemas.microsoft.com/office/drawing/2010/main" xmlns="" w="9525">
                   <a:solidFill>
                     <a:srgbClr val="000000"/>
                   </a:solidFill>
@@ -9752,7 +9757,7 @@
           <a:noFill/>
           <a:extLst>
             <a:ext uri="{909E8E84-426E-40dd-AFC4-6F175D3DCCD1}">
-              <a14:hiddenFill xmlns="" xmlns:a14="http://schemas.microsoft.com/office/drawing/2010/main">
+              <a14:hiddenFill xmlns:a14="http://schemas.microsoft.com/office/drawing/2010/main" xmlns="">
                 <a:solidFill>
                   <a:srgbClr val="FFFFFF"/>
                 </a:solidFill>
@@ -9826,7 +9831,7 @@
               </a:ln>
               <a:extLst>
                 <a:ext uri="{91240B29-F687-4f45-9708-019B960494DF}">
-                  <a14:hiddenLine xmlns="" xmlns:a14="http://schemas.microsoft.com/office/drawing/2010/main" w="9525">
+                  <a14:hiddenLine xmlns:a14="http://schemas.microsoft.com/office/drawing/2010/main" xmlns="" w="9525">
                     <a:solidFill>
                       <a:srgbClr val="000000"/>
                     </a:solidFill>
@@ -9916,7 +9921,7 @@
               </a:ln>
               <a:extLst>
                 <a:ext uri="{91240B29-F687-4f45-9708-019B960494DF}">
-                  <a14:hiddenLine xmlns="" xmlns:a14="http://schemas.microsoft.com/office/drawing/2010/main" w="9525">
+                  <a14:hiddenLine xmlns:a14="http://schemas.microsoft.com/office/drawing/2010/main" xmlns="" w="9525">
                     <a:solidFill>
                       <a:srgbClr val="000000"/>
                     </a:solidFill>
@@ -10006,7 +10011,7 @@
               </a:ln>
               <a:extLst>
                 <a:ext uri="{91240B29-F687-4f45-9708-019B960494DF}">
-                  <a14:hiddenLine xmlns="" xmlns:a14="http://schemas.microsoft.com/office/drawing/2010/main" w="9525">
+                  <a14:hiddenLine xmlns:a14="http://schemas.microsoft.com/office/drawing/2010/main" xmlns="" w="9525">
                     <a:solidFill>
                       <a:srgbClr val="000000"/>
                     </a:solidFill>
@@ -10068,7 +10073,7 @@
               </a:ln>
               <a:extLst>
                 <a:ext uri="{91240B29-F687-4f45-9708-019B960494DF}">
-                  <a14:hiddenLine xmlns="" xmlns:a14="http://schemas.microsoft.com/office/drawing/2010/main" w="9525">
+                  <a14:hiddenLine xmlns:a14="http://schemas.microsoft.com/office/drawing/2010/main" xmlns="" w="9525">
                     <a:solidFill>
                       <a:srgbClr val="000000"/>
                     </a:solidFill>
@@ -10158,7 +10163,7 @@
               </a:ln>
               <a:extLst>
                 <a:ext uri="{91240B29-F687-4f45-9708-019B960494DF}">
-                  <a14:hiddenLine xmlns="" xmlns:a14="http://schemas.microsoft.com/office/drawing/2010/main" w="9525">
+                  <a14:hiddenLine xmlns:a14="http://schemas.microsoft.com/office/drawing/2010/main" xmlns="" w="9525">
                     <a:solidFill>
                       <a:srgbClr val="000000"/>
                     </a:solidFill>
@@ -10220,7 +10225,7 @@
               </a:ln>
               <a:extLst>
                 <a:ext uri="{91240B29-F687-4f45-9708-019B960494DF}">
-                  <a14:hiddenLine xmlns="" xmlns:a14="http://schemas.microsoft.com/office/drawing/2010/main" w="9525">
+                  <a14:hiddenLine xmlns:a14="http://schemas.microsoft.com/office/drawing/2010/main" xmlns="" w="9525">
                     <a:solidFill>
                       <a:srgbClr val="000000"/>
                     </a:solidFill>
@@ -10282,7 +10287,7 @@
               </a:ln>
               <a:extLst>
                 <a:ext uri="{91240B29-F687-4f45-9708-019B960494DF}">
-                  <a14:hiddenLine xmlns="" xmlns:a14="http://schemas.microsoft.com/office/drawing/2010/main" w="9525">
+                  <a14:hiddenLine xmlns:a14="http://schemas.microsoft.com/office/drawing/2010/main" xmlns="" w="9525">
                     <a:solidFill>
                       <a:srgbClr val="000000"/>
                     </a:solidFill>
@@ -10372,7 +10377,7 @@
               </a:ln>
               <a:extLst>
                 <a:ext uri="{91240B29-F687-4f45-9708-019B960494DF}">
-                  <a14:hiddenLine xmlns="" xmlns:a14="http://schemas.microsoft.com/office/drawing/2010/main" w="9525">
+                  <a14:hiddenLine xmlns:a14="http://schemas.microsoft.com/office/drawing/2010/main" xmlns="" w="9525">
                     <a:solidFill>
                       <a:srgbClr val="000000"/>
                     </a:solidFill>
@@ -10462,7 +10467,7 @@
               </a:ln>
               <a:extLst>
                 <a:ext uri="{91240B29-F687-4f45-9708-019B960494DF}">
-                  <a14:hiddenLine xmlns="" xmlns:a14="http://schemas.microsoft.com/office/drawing/2010/main" w="9525">
+                  <a14:hiddenLine xmlns:a14="http://schemas.microsoft.com/office/drawing/2010/main" xmlns="" w="9525">
                     <a:solidFill>
                       <a:srgbClr val="000000"/>
                     </a:solidFill>
@@ -10524,7 +10529,7 @@
               </a:ln>
               <a:extLst>
                 <a:ext uri="{91240B29-F687-4f45-9708-019B960494DF}">
-                  <a14:hiddenLine xmlns="" xmlns:a14="http://schemas.microsoft.com/office/drawing/2010/main" w="9525">
+                  <a14:hiddenLine xmlns:a14="http://schemas.microsoft.com/office/drawing/2010/main" xmlns="" w="9525">
                     <a:solidFill>
                       <a:srgbClr val="000000"/>
                     </a:solidFill>
@@ -10634,7 +10639,7 @@
               </a:ln>
               <a:extLst>
                 <a:ext uri="{91240B29-F687-4f45-9708-019B960494DF}">
-                  <a14:hiddenLine xmlns="" xmlns:a14="http://schemas.microsoft.com/office/drawing/2010/main" w="9525">
+                  <a14:hiddenLine xmlns:a14="http://schemas.microsoft.com/office/drawing/2010/main" xmlns="" w="9525">
                     <a:solidFill>
                       <a:srgbClr val="000000"/>
                     </a:solidFill>
@@ -10718,7 +10723,7 @@
               </a:ln>
               <a:extLst>
                 <a:ext uri="{91240B29-F687-4f45-9708-019B960494DF}">
-                  <a14:hiddenLine xmlns="" xmlns:a14="http://schemas.microsoft.com/office/drawing/2010/main" w="9525">
+                  <a14:hiddenLine xmlns:a14="http://schemas.microsoft.com/office/drawing/2010/main" xmlns="" w="9525">
                     <a:solidFill>
                       <a:srgbClr val="000000"/>
                     </a:solidFill>
@@ -10780,7 +10785,7 @@
               </a:ln>
               <a:extLst>
                 <a:ext uri="{91240B29-F687-4f45-9708-019B960494DF}">
-                  <a14:hiddenLine xmlns="" xmlns:a14="http://schemas.microsoft.com/office/drawing/2010/main" w="9525">
+                  <a14:hiddenLine xmlns:a14="http://schemas.microsoft.com/office/drawing/2010/main" xmlns="" w="9525">
                     <a:solidFill>
                       <a:srgbClr val="000000"/>
                     </a:solidFill>
@@ -10842,7 +10847,7 @@
               </a:ln>
               <a:extLst>
                 <a:ext uri="{91240B29-F687-4f45-9708-019B960494DF}">
-                  <a14:hiddenLine xmlns="" xmlns:a14="http://schemas.microsoft.com/office/drawing/2010/main" w="9525">
+                  <a14:hiddenLine xmlns:a14="http://schemas.microsoft.com/office/drawing/2010/main" xmlns="" w="9525">
                     <a:solidFill>
                       <a:srgbClr val="000000"/>
                     </a:solidFill>
@@ -10932,7 +10937,7 @@
               </a:ln>
               <a:extLst>
                 <a:ext uri="{91240B29-F687-4f45-9708-019B960494DF}">
-                  <a14:hiddenLine xmlns="" xmlns:a14="http://schemas.microsoft.com/office/drawing/2010/main" w="9525">
+                  <a14:hiddenLine xmlns:a14="http://schemas.microsoft.com/office/drawing/2010/main" xmlns="" w="9525">
                     <a:solidFill>
                       <a:srgbClr val="000000"/>
                     </a:solidFill>
@@ -10966,7 +10971,7 @@
               </a:ln>
               <a:extLst>
                 <a:ext uri="{91240B29-F687-4f45-9708-019B960494DF}">
-                  <a14:hiddenLine xmlns="" xmlns:a14="http://schemas.microsoft.com/office/drawing/2010/main" w="9525">
+                  <a14:hiddenLine xmlns:a14="http://schemas.microsoft.com/office/drawing/2010/main" xmlns="" w="9525">
                     <a:solidFill>
                       <a:srgbClr val="000000"/>
                     </a:solidFill>
@@ -11031,7 +11036,7 @@
               </a:ln>
               <a:extLst>
                 <a:ext uri="{91240B29-F687-4f45-9708-019B960494DF}">
-                  <a14:hiddenLine xmlns="" xmlns:a14="http://schemas.microsoft.com/office/drawing/2010/main" w="9525">
+                  <a14:hiddenLine xmlns:a14="http://schemas.microsoft.com/office/drawing/2010/main" xmlns="" w="9525">
                     <a:solidFill>
                       <a:srgbClr val="000000"/>
                     </a:solidFill>
@@ -11121,7 +11126,7 @@
               </a:ln>
               <a:extLst>
                 <a:ext uri="{91240B29-F687-4f45-9708-019B960494DF}">
-                  <a14:hiddenLine xmlns="" xmlns:a14="http://schemas.microsoft.com/office/drawing/2010/main" w="9525">
+                  <a14:hiddenLine xmlns:a14="http://schemas.microsoft.com/office/drawing/2010/main" xmlns="" w="9525">
                     <a:solidFill>
                       <a:srgbClr val="000000"/>
                     </a:solidFill>
@@ -11183,7 +11188,7 @@
               </a:ln>
               <a:extLst>
                 <a:ext uri="{91240B29-F687-4f45-9708-019B960494DF}">
-                  <a14:hiddenLine xmlns="" xmlns:a14="http://schemas.microsoft.com/office/drawing/2010/main" w="9525">
+                  <a14:hiddenLine xmlns:a14="http://schemas.microsoft.com/office/drawing/2010/main" xmlns="" w="9525">
                     <a:solidFill>
                       <a:srgbClr val="000000"/>
                     </a:solidFill>
@@ -11273,7 +11278,7 @@
               </a:ln>
               <a:extLst>
                 <a:ext uri="{91240B29-F687-4f45-9708-019B960494DF}">
-                  <a14:hiddenLine xmlns="" xmlns:a14="http://schemas.microsoft.com/office/drawing/2010/main" w="9525">
+                  <a14:hiddenLine xmlns:a14="http://schemas.microsoft.com/office/drawing/2010/main" xmlns="" w="9525">
                     <a:solidFill>
                       <a:srgbClr val="000000"/>
                     </a:solidFill>
@@ -11338,7 +11343,7 @@
               </a:ln>
               <a:extLst>
                 <a:ext uri="{91240B29-F687-4f45-9708-019B960494DF}">
-                  <a14:hiddenLine xmlns="" xmlns:a14="http://schemas.microsoft.com/office/drawing/2010/main" w="9525">
+                  <a14:hiddenLine xmlns:a14="http://schemas.microsoft.com/office/drawing/2010/main" xmlns="" w="9525">
                     <a:solidFill>
                       <a:srgbClr val="000000"/>
                     </a:solidFill>
@@ -11400,7 +11405,7 @@
               </a:ln>
               <a:extLst>
                 <a:ext uri="{91240B29-F687-4f45-9708-019B960494DF}">
-                  <a14:hiddenLine xmlns="" xmlns:a14="http://schemas.microsoft.com/office/drawing/2010/main" w="9525">
+                  <a14:hiddenLine xmlns:a14="http://schemas.microsoft.com/office/drawing/2010/main" xmlns="" w="9525">
                     <a:solidFill>
                       <a:srgbClr val="000000"/>
                     </a:solidFill>
@@ -11490,7 +11495,7 @@
               </a:ln>
               <a:extLst>
                 <a:ext uri="{91240B29-F687-4f45-9708-019B960494DF}">
-                  <a14:hiddenLine xmlns="" xmlns:a14="http://schemas.microsoft.com/office/drawing/2010/main" w="9525">
+                  <a14:hiddenLine xmlns:a14="http://schemas.microsoft.com/office/drawing/2010/main" xmlns="" w="9525">
                     <a:solidFill>
                       <a:srgbClr val="000000"/>
                     </a:solidFill>
@@ -11580,7 +11585,7 @@
               </a:ln>
               <a:extLst>
                 <a:ext uri="{91240B29-F687-4f45-9708-019B960494DF}">
-                  <a14:hiddenLine xmlns="" xmlns:a14="http://schemas.microsoft.com/office/drawing/2010/main" w="9525">
+                  <a14:hiddenLine xmlns:a14="http://schemas.microsoft.com/office/drawing/2010/main" xmlns="" w="9525">
                     <a:solidFill>
                       <a:srgbClr val="000000"/>
                     </a:solidFill>
@@ -11645,7 +11650,7 @@
               </a:ln>
               <a:extLst>
                 <a:ext uri="{91240B29-F687-4f45-9708-019B960494DF}">
-                  <a14:hiddenLine xmlns="" xmlns:a14="http://schemas.microsoft.com/office/drawing/2010/main" w="9525">
+                  <a14:hiddenLine xmlns:a14="http://schemas.microsoft.com/office/drawing/2010/main" xmlns="" w="9525">
                     <a:solidFill>
                       <a:srgbClr val="000000"/>
                     </a:solidFill>
@@ -11765,7 +11770,7 @@
               </a:ln>
               <a:extLst>
                 <a:ext uri="{91240B29-F687-4f45-9708-019B960494DF}">
-                  <a14:hiddenLine xmlns="" xmlns:a14="http://schemas.microsoft.com/office/drawing/2010/main" w="9525">
+                  <a14:hiddenLine xmlns:a14="http://schemas.microsoft.com/office/drawing/2010/main" xmlns="" w="9525">
                     <a:solidFill>
                       <a:srgbClr val="000000"/>
                     </a:solidFill>
@@ -11846,7 +11851,7 @@
               </a:ln>
               <a:extLst>
                 <a:ext uri="{91240B29-F687-4f45-9708-019B960494DF}">
-                  <a14:hiddenLine xmlns="" xmlns:a14="http://schemas.microsoft.com/office/drawing/2010/main" w="9525">
+                  <a14:hiddenLine xmlns:a14="http://schemas.microsoft.com/office/drawing/2010/main" xmlns="" w="9525">
                     <a:solidFill>
                       <a:srgbClr val="000000"/>
                     </a:solidFill>
@@ -11961,7 +11966,7 @@
               </a:ln>
               <a:extLst>
                 <a:ext uri="{91240B29-F687-4f45-9708-019B960494DF}">
-                  <a14:hiddenLine xmlns="" xmlns:a14="http://schemas.microsoft.com/office/drawing/2010/main" w="9525">
+                  <a14:hiddenLine xmlns:a14="http://schemas.microsoft.com/office/drawing/2010/main" xmlns="" w="9525">
                     <a:solidFill>
                       <a:srgbClr val="000000"/>
                     </a:solidFill>
@@ -12051,7 +12056,7 @@
               </a:ln>
               <a:extLst>
                 <a:ext uri="{91240B29-F687-4f45-9708-019B960494DF}">
-                  <a14:hiddenLine xmlns="" xmlns:a14="http://schemas.microsoft.com/office/drawing/2010/main" w="9525">
+                  <a14:hiddenLine xmlns:a14="http://schemas.microsoft.com/office/drawing/2010/main" xmlns="" w="9525">
                     <a:solidFill>
                       <a:srgbClr val="000000"/>
                     </a:solidFill>
@@ -12116,7 +12121,7 @@
               </a:ln>
               <a:extLst>
                 <a:ext uri="{91240B29-F687-4f45-9708-019B960494DF}">
-                  <a14:hiddenLine xmlns="" xmlns:a14="http://schemas.microsoft.com/office/drawing/2010/main" w="9525">
+                  <a14:hiddenLine xmlns:a14="http://schemas.microsoft.com/office/drawing/2010/main" xmlns="" w="9525">
                     <a:solidFill>
                       <a:srgbClr val="000000"/>
                     </a:solidFill>
@@ -12206,7 +12211,7 @@
               </a:ln>
               <a:extLst>
                 <a:ext uri="{91240B29-F687-4f45-9708-019B960494DF}">
-                  <a14:hiddenLine xmlns="" xmlns:a14="http://schemas.microsoft.com/office/drawing/2010/main" w="9525">
+                  <a14:hiddenLine xmlns:a14="http://schemas.microsoft.com/office/drawing/2010/main" xmlns="" w="9525">
                     <a:solidFill>
                       <a:srgbClr val="000000"/>
                     </a:solidFill>
@@ -12274,7 +12279,7 @@
               </a:ln>
               <a:extLst>
                 <a:ext uri="{91240B29-F687-4f45-9708-019B960494DF}">
-                  <a14:hiddenLine xmlns="" xmlns:a14="http://schemas.microsoft.com/office/drawing/2010/main" w="9525">
+                  <a14:hiddenLine xmlns:a14="http://schemas.microsoft.com/office/drawing/2010/main" xmlns="" w="9525">
                     <a:solidFill>
                       <a:srgbClr val="000000"/>
                     </a:solidFill>
@@ -12364,7 +12369,7 @@
               </a:ln>
               <a:extLst>
                 <a:ext uri="{91240B29-F687-4f45-9708-019B960494DF}">
-                  <a14:hiddenLine xmlns="" xmlns:a14="http://schemas.microsoft.com/office/drawing/2010/main" w="9525">
+                  <a14:hiddenLine xmlns:a14="http://schemas.microsoft.com/office/drawing/2010/main" xmlns="" w="9525">
                     <a:solidFill>
                       <a:srgbClr val="000000"/>
                     </a:solidFill>
@@ -12432,7 +12437,7 @@
               </a:ln>
               <a:extLst>
                 <a:ext uri="{91240B29-F687-4f45-9708-019B960494DF}">
-                  <a14:hiddenLine xmlns="" xmlns:a14="http://schemas.microsoft.com/office/drawing/2010/main" w="9525">
+                  <a14:hiddenLine xmlns:a14="http://schemas.microsoft.com/office/drawing/2010/main" xmlns="" w="9525">
                     <a:solidFill>
                       <a:srgbClr val="000000"/>
                     </a:solidFill>
@@ -12522,7 +12527,7 @@
               </a:ln>
               <a:extLst>
                 <a:ext uri="{91240B29-F687-4f45-9708-019B960494DF}">
-                  <a14:hiddenLine xmlns="" xmlns:a14="http://schemas.microsoft.com/office/drawing/2010/main" w="9525">
+                  <a14:hiddenLine xmlns:a14="http://schemas.microsoft.com/office/drawing/2010/main" xmlns="" w="9525">
                     <a:solidFill>
                       <a:srgbClr val="000000"/>
                     </a:solidFill>
@@ -12556,7 +12561,7 @@
               </a:ln>
               <a:extLst>
                 <a:ext uri="{91240B29-F687-4f45-9708-019B960494DF}">
-                  <a14:hiddenLine xmlns="" xmlns:a14="http://schemas.microsoft.com/office/drawing/2010/main" w="9525">
+                  <a14:hiddenLine xmlns:a14="http://schemas.microsoft.com/office/drawing/2010/main" xmlns="" w="9525">
                     <a:solidFill>
                       <a:srgbClr val="000000"/>
                     </a:solidFill>
@@ -13140,7 +13145,6 @@
               <a:rPr lang="en-US" dirty="0"/>
               <a:t>https://kafka.apache.org/</a:t>
             </a:r>
-            <a:endParaRPr lang="en-US" dirty="0"/>
           </a:p>
         </p:txBody>
       </p:sp>
@@ -13195,6 +13199,13 @@
   <p:clrMapOvr>
     <a:masterClrMapping/>
   </p:clrMapOvr>
+  <p:timing>
+    <p:tnLst>
+      <p:par>
+        <p:cTn id="1" dur="indefinite" restart="never" nodeType="tmRoot"/>
+      </p:par>
+    </p:tnLst>
+  </p:timing>
 </p:sld>
 </file>
 
@@ -13290,6 +13301,13 @@
   <p:clrMapOvr>
     <a:masterClrMapping/>
   </p:clrMapOvr>
+  <p:timing>
+    <p:tnLst>
+      <p:par>
+        <p:cTn id="1" dur="indefinite" restart="never" nodeType="tmRoot"/>
+      </p:par>
+    </p:tnLst>
+  </p:timing>
 </p:sld>
 </file>
 
@@ -13386,6 +13404,13 @@
   <p:clrMapOvr>
     <a:masterClrMapping/>
   </p:clrMapOvr>
+  <p:timing>
+    <p:tnLst>
+      <p:par>
+        <p:cTn id="1" dur="indefinite" restart="never" nodeType="tmRoot"/>
+      </p:par>
+    </p:tnLst>
+  </p:timing>
 </p:sld>
 </file>
 
@@ -13523,6 +13548,13 @@
   <p:clrMapOvr>
     <a:masterClrMapping/>
   </p:clrMapOvr>
+  <p:timing>
+    <p:tnLst>
+      <p:par>
+        <p:cTn id="1" dur="indefinite" restart="never" nodeType="tmRoot"/>
+      </p:par>
+    </p:tnLst>
+  </p:timing>
 </p:sld>
 </file>
 
@@ -13656,6 +13688,13 @@
   <p:clrMapOvr>
     <a:masterClrMapping/>
   </p:clrMapOvr>
+  <p:timing>
+    <p:tnLst>
+      <p:par>
+        <p:cTn id="1" dur="indefinite" restart="never" nodeType="tmRoot"/>
+      </p:par>
+    </p:tnLst>
+  </p:timing>
 </p:sld>
 </file>
 
@@ -16466,6 +16505,13 @@
   <p:clrMapOvr>
     <a:masterClrMapping/>
   </p:clrMapOvr>
+  <p:timing>
+    <p:tnLst>
+      <p:par>
+        <p:cTn id="1" dur="indefinite" restart="never" nodeType="tmRoot"/>
+      </p:par>
+    </p:tnLst>
+  </p:timing>
 </p:sld>
 </file>
 
@@ -16590,7 +16636,6 @@
               <a:rPr lang="en-US" dirty="0"/>
               <a:t> that has started the project: LinkedIn.</a:t>
             </a:r>
-            <a:endParaRPr lang="en-US" dirty="0"/>
           </a:p>
         </p:txBody>
       </p:sp>
@@ -16733,6 +16778,13 @@
   <p:clrMapOvr>
     <a:masterClrMapping/>
   </p:clrMapOvr>
+  <p:timing>
+    <p:tnLst>
+      <p:par>
+        <p:cTn id="1" dur="indefinite" restart="never" nodeType="tmRoot"/>
+      </p:par>
+    </p:tnLst>
+  </p:timing>
 </p:sld>
 </file>
 
@@ -16873,7 +16925,6 @@
               <a:rPr lang="en-US" dirty="0"/>
               <a:t> and bugs respectively</a:t>
             </a:r>
-            <a:endParaRPr lang="en-US" dirty="0"/>
           </a:p>
         </p:txBody>
       </p:sp>
@@ -16962,6 +17013,13 @@
   <p:clrMapOvr>
     <a:masterClrMapping/>
   </p:clrMapOvr>
+  <p:timing>
+    <p:tnLst>
+      <p:par>
+        <p:cTn id="1" dur="indefinite" restart="never" nodeType="tmRoot"/>
+      </p:par>
+    </p:tnLst>
+  </p:timing>
 </p:sld>
 </file>
 
@@ -17091,6 +17149,13 @@
   <p:clrMapOvr>
     <a:masterClrMapping/>
   </p:clrMapOvr>
+  <p:timing>
+    <p:tnLst>
+      <p:par>
+        <p:cTn id="1" dur="indefinite" restart="never" nodeType="tmRoot"/>
+      </p:par>
+    </p:tnLst>
+  </p:timing>
 </p:sld>
 </file>
 
@@ -17231,6 +17296,138 @@
   <p:clrMapOvr>
     <a:masterClrMapping/>
   </p:clrMapOvr>
+  <p:timing>
+    <p:tnLst>
+      <p:par>
+        <p:cTn id="1" dur="indefinite" restart="never" nodeType="tmRoot"/>
+      </p:par>
+    </p:tnLst>
+  </p:timing>
+</p:sld>
+</file>
+
+<file path=ppt/slides/slide19.xml><?xml version="1.0" encoding="utf-8"?>
+<p:sld xmlns:a="http://schemas.openxmlformats.org/drawingml/2006/main" xmlns:r="http://schemas.openxmlformats.org/officeDocument/2006/relationships" xmlns:p="http://schemas.openxmlformats.org/presentationml/2006/main">
+  <p:cSld>
+    <p:spTree>
+      <p:nvGrpSpPr>
+        <p:cNvPr id="1" name=""/>
+        <p:cNvGrpSpPr/>
+        <p:nvPr/>
+      </p:nvGrpSpPr>
+      <p:grpSpPr>
+        <a:xfrm>
+          <a:off x="0" y="0"/>
+          <a:ext cx="0" cy="0"/>
+          <a:chOff x="0" y="0"/>
+          <a:chExt cx="0" cy="0"/>
+        </a:xfrm>
+      </p:grpSpPr>
+      <p:sp>
+        <p:nvSpPr>
+          <p:cNvPr id="2" name="Title 1"/>
+          <p:cNvSpPr>
+            <a:spLocks noGrp="1"/>
+          </p:cNvSpPr>
+          <p:nvPr>
+            <p:ph type="title"/>
+          </p:nvPr>
+        </p:nvSpPr>
+        <p:spPr/>
+        <p:txBody>
+          <a:bodyPr/>
+          <a:lstStyle/>
+          <a:p>
+            <a:r>
+              <a:rPr lang="en-US" dirty="0" smtClean="0"/>
+              <a:t>Conclusion</a:t>
+            </a:r>
+            <a:endParaRPr lang="en-US" dirty="0"/>
+          </a:p>
+        </p:txBody>
+      </p:sp>
+      <p:sp>
+        <p:nvSpPr>
+          <p:cNvPr id="3" name="Content Placeholder 2"/>
+          <p:cNvSpPr>
+            <a:spLocks noGrp="1"/>
+          </p:cNvSpPr>
+          <p:nvPr>
+            <p:ph idx="1"/>
+          </p:nvPr>
+        </p:nvSpPr>
+        <p:spPr>
+          <a:xfrm>
+            <a:off x="1141412" y="2249487"/>
+            <a:ext cx="9905999" cy="449751"/>
+          </a:xfrm>
+        </p:spPr>
+        <p:txBody>
+          <a:bodyPr>
+            <a:normAutofit fontScale="92500" lnSpcReduction="20000"/>
+          </a:bodyPr>
+          <a:lstStyle/>
+          <a:p>
+            <a:r>
+              <a:rPr lang="en-US" dirty="0" smtClean="0"/>
+              <a:t>The essence of Kafka (actual video link from documentation)</a:t>
+            </a:r>
+            <a:endParaRPr lang="en-US" dirty="0"/>
+          </a:p>
+        </p:txBody>
+      </p:sp>
+    </p:spTree>
+    <p:controls>
+      <mc:AlternateContent xmlns:mc="http://schemas.openxmlformats.org/markup-compatibility/2006">
+        <mc:Choice xmlns:v="urn:schemas-microsoft-com:vml" Requires="v">
+          <p:control spid="1026" name="ShockwaveFlash1" r:id="rId2" imgW="4782960" imgH="3535200"/>
+        </mc:Choice>
+        <mc:Fallback>
+          <p:control name="ShockwaveFlash1" r:id="rId2" imgW="4782960" imgH="3535200">
+            <p:pic>
+              <p:nvPicPr>
+                <p:cNvPr id="4" name="ShockwaveFlash1"/>
+                <p:cNvPicPr>
+                  <a:picLocks/>
+                </p:cNvPicPr>
+                <p:nvPr/>
+              </p:nvPicPr>
+              <p:blipFill>
+                <a:blip r:embed="rId4"/>
+                <a:stretch>
+                  <a:fillRect/>
+                </a:stretch>
+              </p:blipFill>
+              <p:spPr>
+                <a:xfrm>
+                  <a:off x="3261947" y="2699238"/>
+                  <a:ext cx="4783138" cy="3535362"/>
+                </a:xfrm>
+                <a:prstGeom prst="rect">
+                  <a:avLst/>
+                </a:prstGeom>
+              </p:spPr>
+            </p:pic>
+          </p:control>
+        </mc:Fallback>
+      </mc:AlternateContent>
+    </p:controls>
+    <p:extLst>
+      <p:ext uri="{BB962C8B-B14F-4D97-AF65-F5344CB8AC3E}">
+        <p14:creationId xmlns:p14="http://schemas.microsoft.com/office/powerpoint/2010/main" val="74487150"/>
+      </p:ext>
+    </p:extLst>
+  </p:cSld>
+  <p:clrMapOvr>
+    <a:masterClrMapping/>
+  </p:clrMapOvr>
+  <p:timing>
+    <p:tnLst>
+      <p:par>
+        <p:cTn id="1" dur="indefinite" restart="never" nodeType="tmRoot"/>
+      </p:par>
+    </p:tnLst>
+  </p:timing>
 </p:sld>
 </file>
 
@@ -17297,19 +17494,7 @@
           <a:p>
             <a:r>
               <a:rPr lang="en-US" dirty="0" smtClean="0"/>
-              <a:t>A </a:t>
-            </a:r>
-            <a:r>
-              <a:rPr lang="en-US" dirty="0" smtClean="0"/>
-              <a:t>Streaming </a:t>
-            </a:r>
-            <a:r>
-              <a:rPr lang="en-US" dirty="0" smtClean="0"/>
-              <a:t>platform, with </a:t>
-            </a:r>
-            <a:r>
-              <a:rPr lang="en-US" dirty="0" smtClean="0"/>
-              <a:t>3 key capabilities:</a:t>
+              <a:t>A Streaming platform, with 3 key capabilities:</a:t>
             </a:r>
           </a:p>
           <a:p>
@@ -17366,6 +17551,13 @@
   <p:clrMapOvr>
     <a:masterClrMapping/>
   </p:clrMapOvr>
+  <p:timing>
+    <p:tnLst>
+      <p:par>
+        <p:cTn id="1" dur="indefinite" restart="never" nodeType="tmRoot"/>
+      </p:par>
+    </p:tnLst>
+  </p:timing>
 </p:sld>
 </file>
 
@@ -17509,6 +17701,13 @@
   <p:clrMapOvr>
     <a:masterClrMapping/>
   </p:clrMapOvr>
+  <p:timing>
+    <p:tnLst>
+      <p:par>
+        <p:cTn id="1" dur="indefinite" restart="never" nodeType="tmRoot"/>
+      </p:par>
+    </p:tnLst>
+  </p:timing>
 </p:sld>
 </file>
 
@@ -17601,6 +17800,13 @@
   <p:clrMapOvr>
     <a:masterClrMapping/>
   </p:clrMapOvr>
+  <p:timing>
+    <p:tnLst>
+      <p:par>
+        <p:cTn id="1" dur="indefinite" restart="never" nodeType="tmRoot"/>
+      </p:par>
+    </p:tnLst>
+  </p:timing>
 </p:sld>
 </file>
 
@@ -17875,6 +18081,13 @@
   <p:clrMapOvr>
     <a:masterClrMapping/>
   </p:clrMapOvr>
+  <p:timing>
+    <p:tnLst>
+      <p:par>
+        <p:cTn id="1" dur="indefinite" restart="never" nodeType="tmRoot"/>
+      </p:par>
+    </p:tnLst>
+  </p:timing>
 </p:sld>
 </file>
 
@@ -18195,6 +18408,13 @@
   <p:clrMapOvr>
     <a:masterClrMapping/>
   </p:clrMapOvr>
+  <p:timing>
+    <p:tnLst>
+      <p:par>
+        <p:cTn id="1" dur="indefinite" restart="never" nodeType="tmRoot"/>
+      </p:par>
+    </p:tnLst>
+  </p:timing>
 </p:sld>
 </file>
 
@@ -18381,6 +18601,13 @@
   <p:clrMapOvr>
     <a:masterClrMapping/>
   </p:clrMapOvr>
+  <p:timing>
+    <p:tnLst>
+      <p:par>
+        <p:cTn id="1" dur="indefinite" restart="never" nodeType="tmRoot"/>
+      </p:par>
+    </p:tnLst>
+  </p:timing>
 </p:sld>
 </file>
 
@@ -18539,6 +18766,13 @@
   <p:clrMapOvr>
     <a:masterClrMapping/>
   </p:clrMapOvr>
+  <p:timing>
+    <p:tnLst>
+      <p:par>
+        <p:cTn id="1" dur="indefinite" restart="never" nodeType="tmRoot"/>
+      </p:par>
+    </p:tnLst>
+  </p:timing>
 </p:sld>
 </file>
 
@@ -18695,6 +18929,13 @@
   <p:clrMapOvr>
     <a:masterClrMapping/>
   </p:clrMapOvr>
+  <p:timing>
+    <p:tnLst>
+      <p:par>
+        <p:cTn id="1" dur="indefinite" restart="never" nodeType="tmRoot"/>
+      </p:par>
+    </p:tnLst>
+  </p:timing>
 </p:sld>
 </file>
 

</xml_diff>